<commit_message>
new sub project Event/State Description Protocol - Brainstorming
</commit_message>
<xml_diff>
--- a/3rd-party-input/SrrTrains-v0.01/TechnicalSummary/Sms3DWeb_20180610.pptx
+++ b/3rd-party-input/SrrTrains-v0.01/TechnicalSummary/Sms3DWeb_20180610.pptx
@@ -119,7 +119,7 @@
   </p:defaultTextStyle>
   <p:extLst>
     <p:ext uri="{EFAFB233-063F-42B5-8137-9DF3F51BA10A}">
-      <p15:sldGuideLst xmlns="" xmlns:p15="http://schemas.microsoft.com/office/powerpoint/2012/main"/>
+      <p15:sldGuideLst xmlns:p15="http://schemas.microsoft.com/office/powerpoint/2012/main" xmlns=""/>
     </p:ext>
   </p:extLst>
 </p:presentation>
@@ -256,7 +256,7 @@
           <a:p>
             <a:fld id="{6300C205-250B-4568-84D0-38BFB37F438F}" type="datetimeFigureOut">
               <a:rPr lang="de-AT" smtClean="0"/>
-              <a:t>10.06.2018</a:t>
+              <a:t>15.03.2019</a:t>
             </a:fld>
             <a:endParaRPr lang="de-AT"/>
           </a:p>
@@ -426,7 +426,7 @@
           <a:p>
             <a:fld id="{6300C205-250B-4568-84D0-38BFB37F438F}" type="datetimeFigureOut">
               <a:rPr lang="de-AT" smtClean="0"/>
-              <a:t>10.06.2018</a:t>
+              <a:t>15.03.2019</a:t>
             </a:fld>
             <a:endParaRPr lang="de-AT"/>
           </a:p>
@@ -606,7 +606,7 @@
           <a:p>
             <a:fld id="{6300C205-250B-4568-84D0-38BFB37F438F}" type="datetimeFigureOut">
               <a:rPr lang="de-AT" smtClean="0"/>
-              <a:t>10.06.2018</a:t>
+              <a:t>15.03.2019</a:t>
             </a:fld>
             <a:endParaRPr lang="de-AT"/>
           </a:p>
@@ -776,7 +776,7 @@
           <a:p>
             <a:fld id="{6300C205-250B-4568-84D0-38BFB37F438F}" type="datetimeFigureOut">
               <a:rPr lang="de-AT" smtClean="0"/>
-              <a:t>10.06.2018</a:t>
+              <a:t>15.03.2019</a:t>
             </a:fld>
             <a:endParaRPr lang="de-AT"/>
           </a:p>
@@ -1022,7 +1022,7 @@
           <a:p>
             <a:fld id="{6300C205-250B-4568-84D0-38BFB37F438F}" type="datetimeFigureOut">
               <a:rPr lang="de-AT" smtClean="0"/>
-              <a:t>10.06.2018</a:t>
+              <a:t>15.03.2019</a:t>
             </a:fld>
             <a:endParaRPr lang="de-AT"/>
           </a:p>
@@ -1254,7 +1254,7 @@
           <a:p>
             <a:fld id="{6300C205-250B-4568-84D0-38BFB37F438F}" type="datetimeFigureOut">
               <a:rPr lang="de-AT" smtClean="0"/>
-              <a:t>10.06.2018</a:t>
+              <a:t>15.03.2019</a:t>
             </a:fld>
             <a:endParaRPr lang="de-AT"/>
           </a:p>
@@ -1621,7 +1621,7 @@
           <a:p>
             <a:fld id="{6300C205-250B-4568-84D0-38BFB37F438F}" type="datetimeFigureOut">
               <a:rPr lang="de-AT" smtClean="0"/>
-              <a:t>10.06.2018</a:t>
+              <a:t>15.03.2019</a:t>
             </a:fld>
             <a:endParaRPr lang="de-AT"/>
           </a:p>
@@ -1739,7 +1739,7 @@
           <a:p>
             <a:fld id="{6300C205-250B-4568-84D0-38BFB37F438F}" type="datetimeFigureOut">
               <a:rPr lang="de-AT" smtClean="0"/>
-              <a:t>10.06.2018</a:t>
+              <a:t>15.03.2019</a:t>
             </a:fld>
             <a:endParaRPr lang="de-AT"/>
           </a:p>
@@ -1834,7 +1834,7 @@
           <a:p>
             <a:fld id="{6300C205-250B-4568-84D0-38BFB37F438F}" type="datetimeFigureOut">
               <a:rPr lang="de-AT" smtClean="0"/>
-              <a:t>10.06.2018</a:t>
+              <a:t>15.03.2019</a:t>
             </a:fld>
             <a:endParaRPr lang="de-AT"/>
           </a:p>
@@ -2111,7 +2111,7 @@
           <a:p>
             <a:fld id="{6300C205-250B-4568-84D0-38BFB37F438F}" type="datetimeFigureOut">
               <a:rPr lang="de-AT" smtClean="0"/>
-              <a:t>10.06.2018</a:t>
+              <a:t>15.03.2019</a:t>
             </a:fld>
             <a:endParaRPr lang="de-AT"/>
           </a:p>
@@ -2364,7 +2364,7 @@
           <a:p>
             <a:fld id="{6300C205-250B-4568-84D0-38BFB37F438F}" type="datetimeFigureOut">
               <a:rPr lang="de-AT" smtClean="0"/>
-              <a:t>10.06.2018</a:t>
+              <a:t>15.03.2019</a:t>
             </a:fld>
             <a:endParaRPr lang="de-AT"/>
           </a:p>
@@ -2577,7 +2577,7 @@
           <a:p>
             <a:fld id="{6300C205-250B-4568-84D0-38BFB37F438F}" type="datetimeFigureOut">
               <a:rPr lang="de-AT" smtClean="0"/>
-              <a:t>10.06.2018</a:t>
+              <a:t>15.03.2019</a:t>
             </a:fld>
             <a:endParaRPr lang="de-AT"/>
           </a:p>
@@ -2998,8 +2998,12 @@
           <a:lstStyle/>
           <a:p>
             <a:r>
-              <a:rPr lang="de-AT" dirty="0"/>
-              <a:t>Simple Multiuser Scenes</a:t>
+              <a:rPr lang="de-AT" smtClean="0"/>
+              <a:t>Simple </a:t>
+            </a:r>
+            <a:r>
+              <a:rPr lang="de-AT" dirty="0"/>
+              <a:t>Multiuser Scenes</a:t>
             </a:r>
             <a:br>
               <a:rPr lang="de-AT" dirty="0"/>
@@ -10294,7 +10298,7 @@
   <a:extraClrSchemeLst/>
   <a:extLst>
     <a:ext uri="{05A4C25C-085E-4340-85A3-A5531E510DB2}">
-      <thm15:themeFamily xmlns="" xmlns:thm15="http://schemas.microsoft.com/office/thememl/2012/main" name="Office Theme" id="{62F939B6-93AF-4DB8-9C6B-D6C7DFDC589F}" vid="{4A3C46E8-61CC-4603-A589-7422A47A8E4A}"/>
+      <thm15:themeFamily xmlns:thm15="http://schemas.microsoft.com/office/thememl/2012/main" xmlns="" name="Office Theme" id="{62F939B6-93AF-4DB8-9C6B-D6C7DFDC589F}" vid="{4A3C46E8-61CC-4603-A589-7422A47A8E4A}"/>
     </a:ext>
   </a:extLst>
 </a:theme>

</xml_diff>